<commit_message>
Edits and corrections to slide deck
</commit_message>
<xml_diff>
--- a/LectureSlides/04_SamplingAndSimulation.pptx
+++ b/LectureSlides/04_SamplingAndSimulation.pptx
@@ -347,7 +347,7 @@
           <a:p>
             <a:fld id="{241EB5C9-1307-BA42-ABA2-0BC069CD8E7F}" type="datetimeFigureOut">
               <a:rPr lang="en-US" smtClean="0"/>
-              <a:t>9/8/2024</a:t>
+              <a:t>9/9/2024</a:t>
             </a:fld>
             <a:endParaRPr lang="en-US"/>
           </a:p>
@@ -515,7 +515,7 @@
           <a:p>
             <a:fld id="{241EB5C9-1307-BA42-ABA2-0BC069CD8E7F}" type="datetimeFigureOut">
               <a:rPr lang="en-US" smtClean="0"/>
-              <a:t>9/8/2024</a:t>
+              <a:t>9/9/2024</a:t>
             </a:fld>
             <a:endParaRPr lang="en-US"/>
           </a:p>
@@ -693,7 +693,7 @@
           <a:p>
             <a:fld id="{241EB5C9-1307-BA42-ABA2-0BC069CD8E7F}" type="datetimeFigureOut">
               <a:rPr lang="en-US" smtClean="0"/>
-              <a:t>9/8/2024</a:t>
+              <a:t>9/9/2024</a:t>
             </a:fld>
             <a:endParaRPr lang="en-US"/>
           </a:p>
@@ -861,7 +861,7 @@
           <a:p>
             <a:fld id="{241EB5C9-1307-BA42-ABA2-0BC069CD8E7F}" type="datetimeFigureOut">
               <a:rPr lang="en-US" smtClean="0"/>
-              <a:t>9/8/2024</a:t>
+              <a:t>9/9/2024</a:t>
             </a:fld>
             <a:endParaRPr lang="en-US"/>
           </a:p>
@@ -1106,7 +1106,7 @@
           <a:p>
             <a:fld id="{241EB5C9-1307-BA42-ABA2-0BC069CD8E7F}" type="datetimeFigureOut">
               <a:rPr lang="en-US" smtClean="0"/>
-              <a:t>9/8/2024</a:t>
+              <a:t>9/9/2024</a:t>
             </a:fld>
             <a:endParaRPr lang="en-US"/>
           </a:p>
@@ -1391,7 +1391,7 @@
           <a:p>
             <a:fld id="{241EB5C9-1307-BA42-ABA2-0BC069CD8E7F}" type="datetimeFigureOut">
               <a:rPr lang="en-US" smtClean="0"/>
-              <a:t>9/8/2024</a:t>
+              <a:t>9/9/2024</a:t>
             </a:fld>
             <a:endParaRPr lang="en-US"/>
           </a:p>
@@ -1810,7 +1810,7 @@
           <a:p>
             <a:fld id="{241EB5C9-1307-BA42-ABA2-0BC069CD8E7F}" type="datetimeFigureOut">
               <a:rPr lang="en-US" smtClean="0"/>
-              <a:t>9/8/2024</a:t>
+              <a:t>9/9/2024</a:t>
             </a:fld>
             <a:endParaRPr lang="en-US"/>
           </a:p>
@@ -1927,7 +1927,7 @@
           <a:p>
             <a:fld id="{241EB5C9-1307-BA42-ABA2-0BC069CD8E7F}" type="datetimeFigureOut">
               <a:rPr lang="en-US" smtClean="0"/>
-              <a:t>9/8/2024</a:t>
+              <a:t>9/9/2024</a:t>
             </a:fld>
             <a:endParaRPr lang="en-US"/>
           </a:p>
@@ -2022,7 +2022,7 @@
           <a:p>
             <a:fld id="{241EB5C9-1307-BA42-ABA2-0BC069CD8E7F}" type="datetimeFigureOut">
               <a:rPr lang="en-US" smtClean="0"/>
-              <a:t>9/8/2024</a:t>
+              <a:t>9/9/2024</a:t>
             </a:fld>
             <a:endParaRPr lang="en-US"/>
           </a:p>
@@ -2297,7 +2297,7 @@
           <a:p>
             <a:fld id="{241EB5C9-1307-BA42-ABA2-0BC069CD8E7F}" type="datetimeFigureOut">
               <a:rPr lang="en-US" smtClean="0"/>
-              <a:t>9/8/2024</a:t>
+              <a:t>9/9/2024</a:t>
             </a:fld>
             <a:endParaRPr lang="en-US"/>
           </a:p>
@@ -2549,7 +2549,7 @@
           <a:p>
             <a:fld id="{241EB5C9-1307-BA42-ABA2-0BC069CD8E7F}" type="datetimeFigureOut">
               <a:rPr lang="en-US" smtClean="0"/>
-              <a:t>9/8/2024</a:t>
+              <a:t>9/9/2024</a:t>
             </a:fld>
             <a:endParaRPr lang="en-US"/>
           </a:p>
@@ -2760,7 +2760,7 @@
           <a:p>
             <a:fld id="{241EB5C9-1307-BA42-ABA2-0BC069CD8E7F}" type="datetimeFigureOut">
               <a:rPr lang="en-US" smtClean="0"/>
-              <a:t>9/8/2024</a:t>
+              <a:t>9/9/2024</a:t>
             </a:fld>
             <a:endParaRPr lang="en-US"/>
           </a:p>
@@ -6879,13 +6879,7 @@
                       <a:rPr>
                         <a:latin typeface="Cambria Math" panose="02040503050406030204" pitchFamily="18" charset="0"/>
                       </a:rPr>
-                      <m:t>=</m:t>
-                    </m:r>
-                    <m:r>
-                      <a:rPr>
-                        <a:latin typeface="Cambria Math" panose="02040503050406030204" pitchFamily="18" charset="0"/>
-                      </a:rPr>
-                      <m:t>50</m:t>
+                      <m:t>=50</m:t>
                     </m:r>
                   </m:oMath>
                 </a14:m>
@@ -7022,8 +7016,8 @@
           </a:p>
         </p:txBody>
       </p:sp>
-      <mc:AlternateContent xmlns:mc="http://schemas.openxmlformats.org/markup-compatibility/2006">
-        <mc:Choice xmlns:a14="http://schemas.microsoft.com/office/drawing/2010/main" Requires="a14">
+      <mc:AlternateContent xmlns:mc="http://schemas.openxmlformats.org/markup-compatibility/2006" xmlns:a14="http://schemas.microsoft.com/office/drawing/2010/main">
+        <mc:Choice Requires="a14">
           <p:sp>
             <p:nvSpPr>
               <p:cNvPr id="3" name="Content Placeholder 2"/>
@@ -7215,7 +7209,7 @@
             </p:txBody>
           </p:sp>
         </mc:Choice>
-        <mc:Fallback>
+        <mc:Fallback xmlns="">
           <p:sp>
             <p:nvSpPr>
               <p:cNvPr id="3" name="Content Placeholder 2"/>
@@ -8791,7 +8785,43 @@
                           <a:rPr>
                             <a:latin typeface="Cambria Math" panose="02040503050406030204" pitchFamily="18" charset="0"/>
                           </a:rPr>
-                          <m:t>0,0,…,1,…,0</m:t>
+                          <m:t>0</m:t>
+                        </m:r>
+                        <m:r>
+                          <a:rPr>
+                            <a:latin typeface="Cambria Math" panose="02040503050406030204" pitchFamily="18" charset="0"/>
+                          </a:rPr>
+                          <m:t>,</m:t>
+                        </m:r>
+                        <m:r>
+                          <a:rPr>
+                            <a:latin typeface="Cambria Math" panose="02040503050406030204" pitchFamily="18" charset="0"/>
+                          </a:rPr>
+                          <m:t>0</m:t>
+                        </m:r>
+                        <m:r>
+                          <a:rPr>
+                            <a:latin typeface="Cambria Math" panose="02040503050406030204" pitchFamily="18" charset="0"/>
+                          </a:rPr>
+                          <m:t>,…,</m:t>
+                        </m:r>
+                        <m:r>
+                          <a:rPr>
+                            <a:latin typeface="Cambria Math" panose="02040503050406030204" pitchFamily="18" charset="0"/>
+                          </a:rPr>
+                          <m:t>1</m:t>
+                        </m:r>
+                        <m:r>
+                          <a:rPr>
+                            <a:latin typeface="Cambria Math" panose="02040503050406030204" pitchFamily="18" charset="0"/>
+                          </a:rPr>
+                          <m:t>,…,</m:t>
+                        </m:r>
+                        <m:r>
+                          <a:rPr>
+                            <a:latin typeface="Cambria Math" panose="02040503050406030204" pitchFamily="18" charset="0"/>
+                          </a:rPr>
+                          <m:t>0</m:t>
                         </m:r>
                       </m:e>
                     </m:d>
@@ -9559,27 +9589,18 @@
             </a:r>
           </a:p>
           <a:p>
-            <a:pPr marL="342900" lvl="0" indent="-342900">
-              <a:buAutoNum type="arabicPeriod"/>
-            </a:pPr>
             <a:r>
               <a:rPr dirty="0"/>
               <a:t>Pooling opinion by county and income group, where income groups and counties have significant differences in population</a:t>
             </a:r>
           </a:p>
           <a:p>
-            <a:pPr marL="342900" lvl="0" indent="-342900">
-              <a:buAutoNum type="arabicPeriod"/>
-            </a:pPr>
             <a:r>
               <a:rPr dirty="0"/>
               <a:t>Testing a drug which may have different effectiveness by sex and ethnic group</a:t>
             </a:r>
           </a:p>
           <a:p>
-            <a:pPr marL="342900" lvl="0" indent="-342900">
-              <a:buAutoNum type="arabicPeriod"/>
-            </a:pPr>
             <a:r>
               <a:rPr dirty="0"/>
               <a:t>Spectral characteristics of stars by type</a:t>
@@ -10102,7 +10123,10 @@
             <a:endParaRPr lang="en-US" dirty="0"/>
           </a:p>
           <a:p>
-            <a:pPr lvl="1"/>
+            <a:pPr marL="800100" lvl="1" indent="-457200">
+              <a:buFont typeface="+mj-lt"/>
+              <a:buAutoNum type="arabicPeriod"/>
+            </a:pPr>
             <a:r>
               <a:rPr dirty="0"/>
               <a:t>Define the clusters for the population</a:t>
@@ -10110,7 +10134,10 @@
             <a:endParaRPr lang="en-US" dirty="0"/>
           </a:p>
           <a:p>
-            <a:pPr lvl="1"/>
+            <a:pPr marL="800100" lvl="1" indent="-457200">
+              <a:buFont typeface="+mj-lt"/>
+              <a:buAutoNum type="arabicPeriod"/>
+            </a:pPr>
             <a:r>
               <a:rPr dirty="0"/>
               <a:t>Randomly select the required number of clusters</a:t>
@@ -10118,7 +10145,10 @@
             <a:endParaRPr lang="en-US" dirty="0"/>
           </a:p>
           <a:p>
-            <a:pPr lvl="1"/>
+            <a:pPr marL="800100" lvl="1" indent="-457200">
+              <a:buFont typeface="+mj-lt"/>
+              <a:buAutoNum type="arabicPeriod"/>
+            </a:pPr>
             <a:r>
               <a:rPr dirty="0"/>
               <a:t>Sample from selected clusters</a:t>
@@ -10126,7 +10156,10 @@
             <a:endParaRPr lang="en-US" dirty="0"/>
           </a:p>
           <a:p>
-            <a:pPr lvl="1"/>
+            <a:pPr marL="800100" lvl="1" indent="-457200">
+              <a:buFont typeface="+mj-lt"/>
+              <a:buAutoNum type="arabicPeriod"/>
+            </a:pPr>
             <a:r>
               <a:rPr dirty="0"/>
               <a:t>Optionally, stratify the sample within each cluster</a:t>
@@ -10658,31 +10691,44 @@
               <a:buNone/>
             </a:pPr>
             <a:r>
+              <a:rPr dirty="0"/>
               <a:t>There are many practical aspects of sampling.</a:t>
             </a:r>
           </a:p>
           <a:p>
             <a:pPr lvl="0"/>
             <a:r>
+              <a:rPr dirty="0"/>
               <a:t>Random sampling is essential to the underlying assumptions of statistical inference</a:t>
             </a:r>
           </a:p>
           <a:p>
             <a:pPr lvl="0"/>
             <a:r>
+              <a:rPr dirty="0"/>
               <a:t>Whenever you are planning to sample data, make sure you have a clear sampling plan</a:t>
             </a:r>
           </a:p>
           <a:p>
             <a:pPr lvl="0"/>
             <a:r>
-              <a:t>Know the number of clusters, strata, samples in advance</a:t>
+              <a:rPr dirty="0"/>
+              <a:t>Know the number of clusters, strata, </a:t>
+            </a:r>
+            <a:r>
+              <a:rPr lang="en-US" dirty="0"/>
+              <a:t>and </a:t>
+            </a:r>
+            <a:r>
+              <a:rPr dirty="0"/>
+              <a:t>samples in advance</a:t>
             </a:r>
           </a:p>
           <a:p>
             <a:pPr lvl="0"/>
             <a:r>
-              <a:t>Don’t just stop sampling when your desired result is achieved: e.g. error measure!</a:t>
+              <a:rPr dirty="0"/>
+              <a:t>Don’t just stop sampling when your desired result is achieved!</a:t>
             </a:r>
           </a:p>
         </p:txBody>
@@ -10731,6 +10777,7 @@
               <a:buNone/>
             </a:pPr>
             <a:r>
+              <a:rPr dirty="0"/>
               <a:t>Introduction to Simulation</a:t>
             </a:r>
           </a:p>
@@ -10754,7 +10801,7 @@
         </p:spPr>
         <p:txBody>
           <a:bodyPr>
-            <a:normAutofit fontScale="92500" lnSpcReduction="10000"/>
+            <a:normAutofit fontScale="92500" lnSpcReduction="20000"/>
           </a:bodyPr>
           <a:lstStyle/>
           <a:p>
@@ -10762,22 +10809,62 @@
               <a:buNone/>
             </a:pPr>
             <a:r>
-              <a:rPr dirty="0"/>
-              <a:t>Simulation enables data scientists to study the behavior of stochastic processes with complex probability distributions</a:t>
+              <a:rPr lang="en-US" b="1" dirty="0">
+                <a:hlinkClick r:id="rId2"/>
+              </a:rPr>
+              <a:t>Monte Carlo s</a:t>
+            </a:r>
+            <a:r>
+              <a:rPr b="1" dirty="0">
+                <a:hlinkClick r:id="rId2"/>
+              </a:rPr>
+              <a:t>imulation</a:t>
+            </a:r>
+            <a:r>
+              <a:rPr lang="en-US" b="1" dirty="0">
+                <a:hlinkClick r:id="rId2"/>
+              </a:rPr>
+              <a:t>s</a:t>
+            </a:r>
+            <a:r>
+              <a:rPr b="1" dirty="0">
+                <a:hlinkClick r:id="rId2"/>
+              </a:rPr>
+              <a:t> </a:t>
+            </a:r>
+            <a:r>
+              <a:rPr dirty="0"/>
+              <a:t>enable data scientists to study the behavior of stochastic processes with complex probability distributions</a:t>
             </a:r>
           </a:p>
           <a:p>
             <a:pPr lvl="0"/>
             <a:r>
               <a:rPr dirty="0"/>
-              <a:t>Most real-world processes have complex behavior, resulting in complex distributions of output values</a:t>
+              <a:t>M</a:t>
+            </a:r>
+            <a:r>
+              <a:rPr lang="en-US" dirty="0"/>
+              <a:t>any</a:t>
+            </a:r>
+            <a:r>
+              <a:rPr dirty="0"/>
+              <a:t> real-world processes have complex distributions of </a:t>
+            </a:r>
+            <a:r>
+              <a:rPr lang="en-US" dirty="0"/>
+              <a:t>observed</a:t>
+            </a:r>
+            <a:r>
+              <a:rPr dirty="0"/>
+              <a:t> values</a:t>
             </a:r>
           </a:p>
           <a:p>
             <a:pPr lvl="1"/>
             <a:r>
               <a:rPr dirty="0"/>
-              <a:t>Simulation is a practical approach to understanding these complex processes</a:t>
+              <a:t>Simulation is a practical approach to understanding complex processes</a:t>
             </a:r>
           </a:p>
           <a:p>
@@ -10808,6 +10895,20 @@
               <a:rPr dirty="0"/>
               <a:t> In these cases, simulation provides a powerful and flexible computational technique to understand behavior</a:t>
             </a:r>
+            <a:endParaRPr lang="en-US" dirty="0"/>
+          </a:p>
+          <a:p>
+            <a:r>
+              <a:rPr lang="en-US" dirty="0"/>
+              <a:t>Complex Monte Carlo simulations are a key component of </a:t>
+            </a:r>
+            <a:r>
+              <a:rPr lang="en-US" b="1" dirty="0">
+                <a:hlinkClick r:id="rId3"/>
+              </a:rPr>
+              <a:t>Digital twin models</a:t>
+            </a:r>
+            <a:endParaRPr dirty="0"/>
           </a:p>
         </p:txBody>
       </p:sp>
@@ -11231,50 +11332,124 @@
         </p:spPr>
         <p:txBody>
           <a:bodyPr>
-            <a:normAutofit fontScale="92500" lnSpcReduction="10000"/>
+            <a:normAutofit fontScale="92500" lnSpcReduction="20000"/>
           </a:bodyPr>
           <a:lstStyle/>
           <a:p>
+            <a:pPr marL="0" lvl="0" indent="0">
+              <a:buNone/>
+            </a:pPr>
+            <a:r>
+              <a:rPr dirty="0"/>
+              <a:t>As cheap computational power has become ubiquitous, </a:t>
+            </a:r>
+            <a:r>
+              <a:rPr lang="en-US" dirty="0"/>
+              <a:t>Monte Carlo </a:t>
+            </a:r>
+            <a:r>
+              <a:rPr dirty="0"/>
+              <a:t>simulation has become a widely used technique</a:t>
+            </a:r>
+          </a:p>
+          <a:p>
             <a:pPr lvl="0"/>
             <a:r>
               <a:rPr dirty="0"/>
-              <a:t>As cheap computational power has become ubiquitous, simulation has become a widely used technique</a:t>
+              <a:t>Simulations compute a large number of cases, or realizations</a:t>
+            </a:r>
+          </a:p>
+          <a:p>
+            <a:pPr lvl="1"/>
+            <a:r>
+              <a:rPr dirty="0"/>
+              <a:t>The computing cost of each realization must be low in any practical simulation</a:t>
+            </a:r>
+          </a:p>
+          <a:p>
+            <a:pPr lvl="1"/>
+            <a:r>
+              <a:rPr dirty="0"/>
+              <a:t>Realizations are drawn </a:t>
+            </a:r>
+            <a:r>
+              <a:rPr lang="en-US" dirty="0"/>
+              <a:t>by </a:t>
+            </a:r>
+            <a:r>
+              <a:rPr lang="en-US" b="1" dirty="0"/>
+              <a:t>Monte Carlo sample</a:t>
+            </a:r>
+            <a:r>
+              <a:rPr b="1" dirty="0"/>
+              <a:t> probability distributions </a:t>
+            </a:r>
+            <a:r>
+              <a:rPr dirty="0"/>
+              <a:t>of the process model</a:t>
             </a:r>
           </a:p>
           <a:p>
             <a:pPr lvl="0"/>
             <a:r>
               <a:rPr dirty="0"/>
-              <a:t>Simulations compute a large number of cases, or realizations</a:t>
+              <a:t>In many cases, realizations are computed </a:t>
+            </a:r>
+            <a:r>
+              <a:rPr lang="en-US" dirty="0"/>
+              <a:t>by sampling </a:t>
+            </a:r>
+            <a:r>
+              <a:rPr dirty="0"/>
+              <a:t>conditional probability distributions</a:t>
             </a:r>
           </a:p>
           <a:p>
             <a:pPr lvl="1"/>
             <a:r>
               <a:rPr dirty="0"/>
-              <a:t>The computing cost of each realization must be low in any practical simulation</a:t>
-            </a:r>
-          </a:p>
-          <a:p>
-            <a:pPr lvl="1"/>
-            <a:r>
-              <a:rPr dirty="0"/>
-              <a:t>Realizations are drawn from complex probability distributions of the process model</a:t>
-            </a:r>
-          </a:p>
-          <a:p>
-            <a:pPr lvl="0"/>
-            <a:r>
-              <a:rPr dirty="0"/>
-              <a:t>In many cases, realizations are computed using conditional probability distributions</a:t>
-            </a:r>
-          </a:p>
-          <a:p>
-            <a:pPr lvl="1"/>
-            <a:r>
-              <a:rPr dirty="0"/>
               <a:t>The final or posterior distribution of the process is comprised of these realizations</a:t>
             </a:r>
+            <a:endParaRPr lang="en-US" dirty="0"/>
+          </a:p>
+          <a:p>
+            <a:pPr marL="0" indent="0">
+              <a:buNone/>
+            </a:pPr>
+            <a:r>
+              <a:rPr lang="en-US" sz="1900" dirty="0">
+                <a:solidFill>
+                  <a:schemeClr val="accent6">
+                    <a:lumMod val="50000"/>
+                  </a:schemeClr>
+                </a:solidFill>
+              </a:rPr>
+              <a:t>You can find a short tutorial on Monte Carlo simulation </a:t>
+            </a:r>
+            <a:r>
+              <a:rPr lang="en-US" sz="1900" dirty="0">
+                <a:solidFill>
+                  <a:schemeClr val="accent6">
+                    <a:lumMod val="50000"/>
+                  </a:schemeClr>
+                </a:solidFill>
+                <a:hlinkClick r:id="rId2">
+                  <a:extLst>
+                    <a:ext uri="{A12FA001-AC4F-418D-AE19-62706E023703}">
+                      <ahyp:hlinkClr xmlns:ahyp="http://schemas.microsoft.com/office/drawing/2018/hyperlinkcolor" val="tx"/>
+                    </a:ext>
+                  </a:extLst>
+                </a:hlinkClick>
+              </a:rPr>
+              <a:t>here</a:t>
+            </a:r>
+            <a:endParaRPr lang="en-US" sz="1900" dirty="0">
+              <a:solidFill>
+                <a:schemeClr val="accent6">
+                  <a:lumMod val="50000"/>
+                </a:schemeClr>
+              </a:solidFill>
+            </a:endParaRPr>
           </a:p>
         </p:txBody>
       </p:sp>
@@ -11362,7 +11537,7 @@
             <a:pPr lvl="0"/>
             <a:r>
               <a:rPr dirty="0"/>
-              <a:t>The graph is a </a:t>
+              <a:t>The graph </a:t>
             </a:r>
             <a:r>
               <a:rPr lang="en-US" dirty="0"/>
@@ -11370,7 +11545,54 @@
             </a:r>
             <a:r>
               <a:rPr dirty="0"/>
-              <a:t>showing which variables are independent and which are conditionally dependent on others with the shapes used representing the type of nodes</a:t>
+              <a:t>show</a:t>
+            </a:r>
+            <a:r>
+              <a:rPr lang="en-US" dirty="0"/>
+              <a:t>s</a:t>
+            </a:r>
+            <a:r>
+              <a:rPr dirty="0"/>
+              <a:t> independent</a:t>
+            </a:r>
+            <a:r>
+              <a:rPr lang="en-US" dirty="0"/>
+              <a:t> and</a:t>
+            </a:r>
+            <a:r>
+              <a:rPr dirty="0"/>
+              <a:t> conditionally dependent </a:t>
+            </a:r>
+            <a:r>
+              <a:rPr lang="en-US" dirty="0"/>
+              <a:t>variables</a:t>
+            </a:r>
+          </a:p>
+          <a:p>
+            <a:pPr lvl="0"/>
+            <a:r>
+              <a:rPr lang="en-US" dirty="0"/>
+              <a:t>S</a:t>
+            </a:r>
+            <a:r>
+              <a:rPr dirty="0"/>
+              <a:t>hapes represent </a:t>
+            </a:r>
+            <a:r>
+              <a:rPr lang="en-US" dirty="0"/>
+              <a:t>different </a:t>
+            </a:r>
+            <a:r>
+              <a:rPr dirty="0"/>
+              <a:t>type</a:t>
+            </a:r>
+            <a:r>
+              <a:rPr lang="en-US" dirty="0"/>
+              <a:t>s</a:t>
+            </a:r>
+            <a:r>
+              <a:rPr dirty="0"/>
+              <a:t> of nodes</a:t>
             </a:r>
           </a:p>
           <a:p>
@@ -11490,7 +11712,7 @@
         </p:spPr>
         <p:txBody>
           <a:bodyPr>
-            <a:normAutofit fontScale="92500" lnSpcReduction="20000"/>
+            <a:normAutofit fontScale="92500"/>
           </a:bodyPr>
           <a:lstStyle/>
           <a:p>
@@ -11498,13 +11720,18 @@
               <a:buNone/>
             </a:pPr>
             <a:r>
-              <a:rPr dirty="0"/>
-              <a:t>When creating a simulation with multiple conditionally dependent variables it is useful to draw a directed graph; a </a:t>
+              <a:rPr lang="en-US" dirty="0"/>
+              <a:t>A </a:t>
             </a:r>
             <a:r>
               <a:rPr b="1" dirty="0"/>
               <a:t>directed acyclic graphical model or DAG</a:t>
             </a:r>
+            <a:r>
+              <a:rPr lang="en-US" dirty="0"/>
+              <a:t> is an intuitive representation of a Monte Carlo simulation model</a:t>
+            </a:r>
+            <a:endParaRPr b="1" dirty="0"/>
           </a:p>
           <a:p>
             <a:pPr lvl="0"/>
@@ -11514,7 +11741,7 @@
             </a:r>
             <a:r>
               <a:rPr dirty="0"/>
-              <a:t> of the variables are shown as </a:t>
+              <a:t> are shown as </a:t>
             </a:r>
             <a:r>
               <a:rPr b="1" dirty="0"/>
@@ -11525,7 +11752,15 @@
             <a:pPr lvl="1"/>
             <a:r>
               <a:rPr dirty="0"/>
-              <a:t>Distributions have parameters which must be estimated</a:t>
+              <a:t>Distributions have </a:t>
+            </a:r>
+            <a:r>
+              <a:rPr b="1" dirty="0"/>
+              <a:t>parameters</a:t>
+            </a:r>
+            <a:r>
+              <a:rPr dirty="0"/>
+              <a:t> which must be estimated</a:t>
             </a:r>
           </a:p>
           <a:p>
@@ -11536,7 +11771,23 @@
             </a:r>
             <a:r>
               <a:rPr dirty="0"/>
-              <a:t> are deterministic and are shown as </a:t>
+              <a:t> are </a:t>
+            </a:r>
+            <a:r>
+              <a:rPr b="1" dirty="0"/>
+              <a:t>deterministic </a:t>
+            </a:r>
+            <a:r>
+              <a:rPr dirty="0"/>
+              <a:t>and</a:t>
+            </a:r>
+            <a:r>
+              <a:rPr lang="en-US" dirty="0"/>
+              <a:t> </a:t>
+            </a:r>
+            <a:r>
+              <a:rPr dirty="0"/>
+              <a:t>shown as </a:t>
             </a:r>
             <a:r>
               <a:rPr b="1" dirty="0"/>
@@ -11547,13 +11798,6 @@
             <a:pPr lvl="1"/>
             <a:r>
               <a:rPr dirty="0"/>
-              <a:t>Decisions are determined by variables</a:t>
-            </a:r>
-          </a:p>
-          <a:p>
-            <a:pPr lvl="1"/>
-            <a:r>
-              <a:rPr dirty="0"/>
               <a:t>Setting decision variables can be performed either manually or automatically</a:t>
             </a:r>
           </a:p>
@@ -11565,7 +11809,15 @@
             </a:r>
             <a:r>
               <a:rPr dirty="0"/>
-              <a:t>, profit in this case, are shown as </a:t>
+              <a:t>, </a:t>
+            </a:r>
+            <a:r>
+              <a:rPr lang="en-US" dirty="0"/>
+              <a:t>e.g. </a:t>
+            </a:r>
+            <a:r>
+              <a:rPr dirty="0"/>
+              <a:t>profit in this case, are shown as </a:t>
             </a:r>
             <a:r>
               <a:rPr b="1" dirty="0"/>
@@ -11591,7 +11843,11 @@
             <a:pPr lvl="1"/>
             <a:r>
               <a:rPr dirty="0"/>
-              <a:t>Utility calculations are deterministic given the input values</a:t>
+              <a:t>Utility calculations are </a:t>
+            </a:r>
+            <a:r>
+              <a:rPr b="1" dirty="0"/>
+              <a:t>deterministic</a:t>
             </a:r>
           </a:p>
         </p:txBody>
@@ -11827,7 +12083,11 @@
             <a:pPr lvl="0"/>
             <a:r>
               <a:rPr dirty="0"/>
-              <a:t>Nodes with no dependency are independent distributions</a:t>
+              <a:t>Nodes with no dependency are </a:t>
+            </a:r>
+            <a:r>
+              <a:rPr b="1" dirty="0"/>
+              <a:t>independent distributions</a:t>
             </a:r>
           </a:p>
           <a:p>
@@ -11852,7 +12112,15 @@
             </a:r>
             <a:r>
               <a:rPr dirty="0"/>
-              <a:t> distributions are conditional on their </a:t>
+              <a:t> distributions are </a:t>
+            </a:r>
+            <a:r>
+              <a:rPr b="1" dirty="0"/>
+              <a:t>conditional</a:t>
+            </a:r>
+            <a:r>
+              <a:rPr dirty="0"/>
+              <a:t> on their </a:t>
             </a:r>
             <a:r>
               <a:rPr b="1" dirty="0"/>
@@ -11881,7 +12149,15 @@
             </a:r>
             <a:r>
               <a:rPr dirty="0"/>
-              <a:t> deterministically change the model parameters</a:t>
+              <a:t> </a:t>
+            </a:r>
+            <a:r>
+              <a:rPr b="1" dirty="0"/>
+              <a:t>deterministically</a:t>
+            </a:r>
+            <a:r>
+              <a:rPr dirty="0"/>
+              <a:t> change the model parameters</a:t>
             </a:r>
           </a:p>
           <a:p>
@@ -11891,8 +12167,28 @@
               <a:t>Utility node</a:t>
             </a:r>
             <a:r>
-              <a:rPr dirty="0"/>
-              <a:t> uses a fixed deterministic formula to compute the value for each realization of the simulation</a:t>
+              <a:rPr lang="en-US" b="1" dirty="0"/>
+              <a:t>s</a:t>
+            </a:r>
+            <a:r>
+              <a:rPr dirty="0"/>
+              <a:t> use a fixed </a:t>
+            </a:r>
+            <a:r>
+              <a:rPr b="1" dirty="0"/>
+              <a:t>deterministic</a:t>
+            </a:r>
+            <a:r>
+              <a:rPr dirty="0"/>
+              <a:t> </a:t>
+            </a:r>
+            <a:r>
+              <a:rPr b="1" dirty="0"/>
+              <a:t>formula</a:t>
+            </a:r>
+            <a:r>
+              <a:rPr dirty="0"/>
+              <a:t> to compute the value for each realization of the simulation</a:t>
             </a:r>
           </a:p>
         </p:txBody>
@@ -11989,19 +12285,47 @@
             <a:pPr lvl="0"/>
             <a:r>
               <a:rPr dirty="0"/>
-              <a:t>Test your overall simulation each time you add a new functional component - </a:t>
-            </a:r>
-            <a:r>
-              <a:rPr b="1" dirty="0"/>
+              <a:t>Test your overall simulation each time you add a new functional component </a:t>
+            </a:r>
+            <a:r>
+              <a:rPr dirty="0">
+                <a:solidFill>
+                  <a:srgbClr val="C00000"/>
+                </a:solidFill>
+              </a:rPr>
+              <a:t>- </a:t>
+            </a:r>
+            <a:r>
+              <a:rPr b="1" dirty="0">
+                <a:solidFill>
+                  <a:srgbClr val="C00000"/>
+                </a:solidFill>
+              </a:rPr>
               <a:t>avoid big bang integration!</a:t>
             </a:r>
-            <a:endParaRPr dirty="0"/>
+            <a:endParaRPr dirty="0">
+              <a:solidFill>
+                <a:srgbClr val="C00000"/>
+              </a:solidFill>
+            </a:endParaRPr>
           </a:p>
           <a:p>
             <a:pPr lvl="0"/>
             <a:r>
-              <a:rPr dirty="0"/>
-              <a:t>Simulations are inherently stochastic, set a seed before you begin tests so they are repeatable</a:t>
+              <a:rPr lang="en-US" dirty="0"/>
+              <a:t>Monte Carlo s</a:t>
+            </a:r>
+            <a:r>
+              <a:rPr dirty="0"/>
+              <a:t>imulations are inherently stochastic, set a seed </a:t>
+            </a:r>
+            <a:r>
+              <a:rPr lang="en-US" dirty="0"/>
+              <a:t>so tests are </a:t>
+            </a:r>
+            <a:r>
+              <a:rPr dirty="0"/>
+              <a:t>repeatable</a:t>
             </a:r>
           </a:p>
         </p:txBody>
@@ -12138,7 +12462,23 @@
             <a:pPr lvl="0"/>
             <a:r>
               <a:rPr dirty="0"/>
-              <a:t>Sampling from distribution is the building block of simulation</a:t>
+              <a:t>Sampling from distribution</a:t>
+            </a:r>
+            <a:r>
+              <a:rPr lang="en-US" dirty="0"/>
+              <a:t>s</a:t>
+            </a:r>
+            <a:r>
+              <a:rPr dirty="0"/>
+              <a:t> is the building block of </a:t>
+            </a:r>
+            <a:r>
+              <a:rPr lang="en-US" dirty="0"/>
+              <a:t>Monte Carlo </a:t>
+            </a:r>
+            <a:r>
+              <a:rPr dirty="0"/>
+              <a:t>simulation</a:t>
             </a:r>
           </a:p>
         </p:txBody>
@@ -12643,13 +12983,7 @@
                         <a:rPr>
                           <a:latin typeface="Cambria Math" panose="02040503050406030204" pitchFamily="18" charset="0"/>
                         </a:rPr>
-                        <m:t>2</m:t>
-                      </m:r>
-                      <m:r>
-                        <a:rPr>
-                          <a:latin typeface="Cambria Math" panose="02040503050406030204" pitchFamily="18" charset="0"/>
-                        </a:rPr>
-                        <m:t>,…,</m:t>
+                        <m:t>2,…,</m:t>
                       </m:r>
                       <m:r>
                         <a:rPr>

</xml_diff>

<commit_message>
Corrected Bernoulli probability on slide 33 to 0.04
</commit_message>
<xml_diff>
--- a/LectureSlides/04_SamplingAndSimulation.pptx
+++ b/LectureSlides/04_SamplingAndSimulation.pptx
@@ -9711,17 +9711,16 @@
                   <a:buNone/>
                 </a:pPr>
                 <a:r>
-                  <a:rPr sz="1800" dirty="0"/>
+                  <a:rPr lang="en-US" sz="1800" dirty="0"/>
                   <a:t>The population of 10000 samples from the standard Normal distribution</a:t>
                 </a:r>
               </a:p>
               <a:p>
                 <a:pPr lvl="0"/>
                 <a:r>
-                  <a:rPr sz="1800" dirty="0"/>
+                  <a:rPr lang="en-US" sz="1800" dirty="0"/>
                   <a:t>The mean of each group should be close to 0.0:</a:t>
                 </a:r>
-                <a:endParaRPr lang="en-US" sz="1800" dirty="0"/>
               </a:p>
               <a:p>
                 <a:pPr marL="457200" lvl="0" indent="-457200">
@@ -9729,10 +9728,9 @@
                   <a:buAutoNum type="arabicPeriod"/>
                 </a:pPr>
                 <a:r>
-                  <a:rPr sz="1800" dirty="0"/>
+                  <a:rPr lang="en-US" sz="1800" dirty="0"/>
                   <a:t>The sample is divided between 4 groups</a:t>
                 </a:r>
-                <a:endParaRPr lang="en-US" sz="1800" dirty="0"/>
               </a:p>
               <a:p>
                 <a:pPr marL="457200" lvl="0" indent="-457200">
@@ -9740,48 +9738,40 @@
                   <a:buAutoNum type="arabicPeriod"/>
                 </a:pPr>
                 <a:r>
-                  <a:rPr sz="1800" dirty="0"/>
-                  <a:t>Probability of sampl</a:t>
-                </a:r>
-                <a:r>
                   <a:rPr lang="en-US" sz="1800" dirty="0"/>
-                  <a:t>ing</a:t>
-                </a:r>
-                <a:r>
-                  <a:rPr sz="1800" dirty="0"/>
-                  <a:t>, </a:t>
+                  <a:t>Probability of sampling, </a:t>
                 </a:r>
                 <a14:m>
                   <m:oMath xmlns:m="http://schemas.openxmlformats.org/officeDocument/2006/math">
                     <m:r>
-                      <a:rPr sz="1800">
+                      <a:rPr lang="en-US" sz="1800">
                         <a:latin typeface="Cambria Math" panose="02040503050406030204" pitchFamily="18" charset="0"/>
                       </a:rPr>
                       <m:t>𝑝</m:t>
                     </m:r>
                     <m:r>
-                      <a:rPr sz="1800">
+                      <a:rPr lang="en-US" sz="1800">
                         <a:latin typeface="Cambria Math" panose="02040503050406030204" pitchFamily="18" charset="0"/>
                       </a:rPr>
                       <m:t>=</m:t>
                     </m:r>
                     <m:r>
-                      <a:rPr sz="1800">
+                      <a:rPr lang="en-US" sz="1800">
                         <a:latin typeface="Cambria Math" panose="02040503050406030204" pitchFamily="18" charset="0"/>
                       </a:rPr>
                       <m:t>0</m:t>
                     </m:r>
                     <m:r>
-                      <a:rPr sz="1800">
+                      <a:rPr lang="en-US" sz="1800">
                         <a:latin typeface="Cambria Math" panose="02040503050406030204" pitchFamily="18" charset="0"/>
                       </a:rPr>
                       <m:t>.</m:t>
                     </m:r>
                     <m:r>
-                      <a:rPr sz="1800">
+                      <a:rPr lang="en-US" sz="1800" b="0" i="0" smtClean="0">
                         <a:latin typeface="Cambria Math" panose="02040503050406030204" pitchFamily="18" charset="0"/>
                       </a:rPr>
-                      <m:t>1</m:t>
+                      <m:t>04</m:t>
                     </m:r>
                   </m:oMath>
                 </a14:m>
@@ -9793,10 +9783,9 @@
                   <a:buAutoNum type="arabicPeriod"/>
                 </a:pPr>
                 <a:r>
-                  <a:rPr sz="1800" dirty="0"/>
+                  <a:rPr lang="en-US" sz="1800" dirty="0"/>
                   <a:t>Summary statistics are computed for each group</a:t>
                 </a:r>
-                <a:endParaRPr lang="en-US" sz="1800" dirty="0"/>
               </a:p>
               <a:p>
                 <a:pPr lvl="0"/>

</xml_diff>

<commit_message>
Fixed typos, rewordered slides
</commit_message>
<xml_diff>
--- a/LectureSlides/04_SamplingAndSimulation.pptx
+++ b/LectureSlides/04_SamplingAndSimulation.pptx
@@ -257,7 +257,7 @@
           <a:p>
             <a:fld id="{5558A1AA-8502-4342-9C4F-4F7467E21DCA}" type="datetimeFigureOut">
               <a:rPr lang="en-US" smtClean="0"/>
-              <a:t>9/18/2024</a:t>
+              <a:t>9/30/2025</a:t>
             </a:fld>
             <a:endParaRPr lang="en-US"/>
           </a:p>
@@ -787,7 +787,7 @@
           <a:p>
             <a:fld id="{241EB5C9-1307-BA42-ABA2-0BC069CD8E7F}" type="datetimeFigureOut">
               <a:rPr lang="en-US" smtClean="0"/>
-              <a:t>9/18/2024</a:t>
+              <a:t>9/30/2025</a:t>
             </a:fld>
             <a:endParaRPr lang="en-US"/>
           </a:p>
@@ -955,7 +955,7 @@
           <a:p>
             <a:fld id="{241EB5C9-1307-BA42-ABA2-0BC069CD8E7F}" type="datetimeFigureOut">
               <a:rPr lang="en-US" smtClean="0"/>
-              <a:t>9/18/2024</a:t>
+              <a:t>9/30/2025</a:t>
             </a:fld>
             <a:endParaRPr lang="en-US"/>
           </a:p>
@@ -1133,7 +1133,7 @@
           <a:p>
             <a:fld id="{241EB5C9-1307-BA42-ABA2-0BC069CD8E7F}" type="datetimeFigureOut">
               <a:rPr lang="en-US" smtClean="0"/>
-              <a:t>9/18/2024</a:t>
+              <a:t>9/30/2025</a:t>
             </a:fld>
             <a:endParaRPr lang="en-US"/>
           </a:p>
@@ -1301,7 +1301,7 @@
           <a:p>
             <a:fld id="{241EB5C9-1307-BA42-ABA2-0BC069CD8E7F}" type="datetimeFigureOut">
               <a:rPr lang="en-US" smtClean="0"/>
-              <a:t>9/18/2024</a:t>
+              <a:t>9/30/2025</a:t>
             </a:fld>
             <a:endParaRPr lang="en-US"/>
           </a:p>
@@ -1546,7 +1546,7 @@
           <a:p>
             <a:fld id="{241EB5C9-1307-BA42-ABA2-0BC069CD8E7F}" type="datetimeFigureOut">
               <a:rPr lang="en-US" smtClean="0"/>
-              <a:t>9/18/2024</a:t>
+              <a:t>9/30/2025</a:t>
             </a:fld>
             <a:endParaRPr lang="en-US"/>
           </a:p>
@@ -1831,7 +1831,7 @@
           <a:p>
             <a:fld id="{241EB5C9-1307-BA42-ABA2-0BC069CD8E7F}" type="datetimeFigureOut">
               <a:rPr lang="en-US" smtClean="0"/>
-              <a:t>9/18/2024</a:t>
+              <a:t>9/30/2025</a:t>
             </a:fld>
             <a:endParaRPr lang="en-US"/>
           </a:p>
@@ -2250,7 +2250,7 @@
           <a:p>
             <a:fld id="{241EB5C9-1307-BA42-ABA2-0BC069CD8E7F}" type="datetimeFigureOut">
               <a:rPr lang="en-US" smtClean="0"/>
-              <a:t>9/18/2024</a:t>
+              <a:t>9/30/2025</a:t>
             </a:fld>
             <a:endParaRPr lang="en-US"/>
           </a:p>
@@ -2367,7 +2367,7 @@
           <a:p>
             <a:fld id="{241EB5C9-1307-BA42-ABA2-0BC069CD8E7F}" type="datetimeFigureOut">
               <a:rPr lang="en-US" smtClean="0"/>
-              <a:t>9/18/2024</a:t>
+              <a:t>9/30/2025</a:t>
             </a:fld>
             <a:endParaRPr lang="en-US"/>
           </a:p>
@@ -2462,7 +2462,7 @@
           <a:p>
             <a:fld id="{241EB5C9-1307-BA42-ABA2-0BC069CD8E7F}" type="datetimeFigureOut">
               <a:rPr lang="en-US" smtClean="0"/>
-              <a:t>9/18/2024</a:t>
+              <a:t>9/30/2025</a:t>
             </a:fld>
             <a:endParaRPr lang="en-US"/>
           </a:p>
@@ -2737,7 +2737,7 @@
           <a:p>
             <a:fld id="{241EB5C9-1307-BA42-ABA2-0BC069CD8E7F}" type="datetimeFigureOut">
               <a:rPr lang="en-US" smtClean="0"/>
-              <a:t>9/18/2024</a:t>
+              <a:t>9/30/2025</a:t>
             </a:fld>
             <a:endParaRPr lang="en-US"/>
           </a:p>
@@ -2989,7 +2989,7 @@
           <a:p>
             <a:fld id="{241EB5C9-1307-BA42-ABA2-0BC069CD8E7F}" type="datetimeFigureOut">
               <a:rPr lang="en-US" smtClean="0"/>
-              <a:t>9/18/2024</a:t>
+              <a:t>9/30/2025</a:t>
             </a:fld>
             <a:endParaRPr lang="en-US"/>
           </a:p>
@@ -3200,7 +3200,7 @@
           <a:p>
             <a:fld id="{241EB5C9-1307-BA42-ABA2-0BC069CD8E7F}" type="datetimeFigureOut">
               <a:rPr lang="en-US" smtClean="0"/>
-              <a:t>9/18/2024</a:t>
+              <a:t>9/30/2025</a:t>
             </a:fld>
             <a:endParaRPr lang="en-US"/>
           </a:p>
@@ -4589,8 +4589,8 @@
           </a:p>
         </p:txBody>
       </p:sp>
-      <mc:AlternateContent xmlns:mc="http://schemas.openxmlformats.org/markup-compatibility/2006">
-        <mc:Choice xmlns:a14="http://schemas.microsoft.com/office/drawing/2010/main" Requires="a14">
+      <mc:AlternateContent xmlns:mc="http://schemas.openxmlformats.org/markup-compatibility/2006" xmlns:a14="http://schemas.microsoft.com/office/drawing/2010/main">
+        <mc:Choice Requires="a14">
           <p:sp>
             <p:nvSpPr>
               <p:cNvPr id="3" name="Content Placeholder 2"/>
@@ -4791,7 +4791,7 @@
             </p:txBody>
           </p:sp>
         </mc:Choice>
-        <mc:Fallback>
+        <mc:Fallback xmlns="">
           <p:sp>
             <p:nvSpPr>
               <p:cNvPr id="3" name="Content Placeholder 2"/>
@@ -4878,8 +4878,8 @@
           </a:p>
         </p:txBody>
       </p:sp>
-      <mc:AlternateContent xmlns:mc="http://schemas.openxmlformats.org/markup-compatibility/2006">
-        <mc:Choice xmlns:a14="http://schemas.microsoft.com/office/drawing/2010/main" Requires="a14">
+      <mc:AlternateContent xmlns:mc="http://schemas.openxmlformats.org/markup-compatibility/2006" xmlns:a14="http://schemas.microsoft.com/office/drawing/2010/main">
+        <mc:Choice Requires="a14">
           <p:sp>
             <p:nvSpPr>
               <p:cNvPr id="3" name="Content Placeholder 2"/>
@@ -5146,7 +5146,7 @@
             </p:txBody>
           </p:sp>
         </mc:Choice>
-        <mc:Fallback>
+        <mc:Fallback xmlns="">
           <p:sp>
             <p:nvSpPr>
               <p:cNvPr id="3" name="Content Placeholder 2"/>
@@ -5238,8 +5238,8 @@
           </a:p>
         </p:txBody>
       </p:sp>
-      <mc:AlternateContent xmlns:mc="http://schemas.openxmlformats.org/markup-compatibility/2006">
-        <mc:Choice xmlns:a14="http://schemas.microsoft.com/office/drawing/2010/main" Requires="a14">
+      <mc:AlternateContent xmlns:mc="http://schemas.openxmlformats.org/markup-compatibility/2006" xmlns:a14="http://schemas.microsoft.com/office/drawing/2010/main">
+        <mc:Choice Requires="a14">
           <p:sp>
             <p:nvSpPr>
               <p:cNvPr id="3" name="Content Placeholder 2"/>
@@ -5372,7 +5372,7 @@
             </p:txBody>
           </p:sp>
         </mc:Choice>
-        <mc:Fallback>
+        <mc:Fallback xmlns="">
           <p:sp>
             <p:nvSpPr>
               <p:cNvPr id="3" name="Content Placeholder 2"/>
@@ -5946,15 +5946,7 @@
                 <a:pPr lvl="0"/>
                 <a:r>
                   <a:rPr lang="en-US" dirty="0"/>
-                  <a:t>Weak law of large numbers applies to </a:t>
-                </a:r>
-                <a:r>
-                  <a:rPr lang="en-US" dirty="0" err="1"/>
-                  <a:t>estiamtes</a:t>
-                </a:r>
-                <a:r>
-                  <a:rPr lang="en-US" dirty="0"/>
-                  <a:t> of parameters of a machine learning model</a:t>
+                  <a:t>Weak law of large numbers applies to estimates of parameters of a machine learning model</a:t>
                 </a:r>
                 <a:endParaRPr dirty="0"/>
               </a:p>
@@ -6248,8 +6240,8 @@
           </a:p>
         </p:txBody>
       </p:sp>
-      <mc:AlternateContent xmlns:mc="http://schemas.openxmlformats.org/markup-compatibility/2006">
-        <mc:Choice xmlns:a14="http://schemas.microsoft.com/office/drawing/2010/main" Requires="a14">
+      <mc:AlternateContent xmlns:mc="http://schemas.openxmlformats.org/markup-compatibility/2006" xmlns:a14="http://schemas.microsoft.com/office/drawing/2010/main">
+        <mc:Choice Requires="a14">
           <p:sp>
             <p:nvSpPr>
               <p:cNvPr id="4" name="Text Placeholder 3"/>
@@ -6318,7 +6310,7 @@
             </p:txBody>
           </p:sp>
         </mc:Choice>
-        <mc:Fallback>
+        <mc:Fallback xmlns="">
           <p:sp>
             <p:nvSpPr>
               <p:cNvPr id="4" name="Text Placeholder 3"/>
@@ -7157,8 +7149,8 @@
           </a:p>
         </p:txBody>
       </p:sp>
-      <mc:AlternateContent xmlns:mc="http://schemas.openxmlformats.org/markup-compatibility/2006">
-        <mc:Choice xmlns:a14="http://schemas.microsoft.com/office/drawing/2010/main" Requires="a14">
+      <mc:AlternateContent xmlns:mc="http://schemas.openxmlformats.org/markup-compatibility/2006" xmlns:a14="http://schemas.microsoft.com/office/drawing/2010/main">
+        <mc:Choice Requires="a14">
           <p:sp>
             <p:nvSpPr>
               <p:cNvPr id="3" name="Content Placeholder 2"/>
@@ -7321,7 +7313,7 @@
             </p:txBody>
           </p:sp>
         </mc:Choice>
-        <mc:Fallback>
+        <mc:Fallback xmlns="">
           <p:sp>
             <p:nvSpPr>
               <p:cNvPr id="3" name="Content Placeholder 2"/>
@@ -7682,13 +7674,7 @@
                       <a:rPr>
                         <a:latin typeface="Cambria Math" panose="02040503050406030204" pitchFamily="18" charset="0"/>
                       </a:rPr>
-                      <m:t>=</m:t>
-                    </m:r>
-                    <m:r>
-                      <a:rPr>
-                        <a:latin typeface="Cambria Math" panose="02040503050406030204" pitchFamily="18" charset="0"/>
-                      </a:rPr>
-                      <m:t>50</m:t>
+                      <m:t>=50</m:t>
                     </m:r>
                   </m:oMath>
                 </a14:m>
@@ -7834,8 +7820,8 @@
           </a:p>
         </p:txBody>
       </p:sp>
-      <mc:AlternateContent xmlns:mc="http://schemas.openxmlformats.org/markup-compatibility/2006">
-        <mc:Choice xmlns:a14="http://schemas.microsoft.com/office/drawing/2010/main" Requires="a14">
+      <mc:AlternateContent xmlns:mc="http://schemas.openxmlformats.org/markup-compatibility/2006" xmlns:a14="http://schemas.microsoft.com/office/drawing/2010/main">
+        <mc:Choice Requires="a14">
           <p:sp>
             <p:nvSpPr>
               <p:cNvPr id="3" name="Content Placeholder 2"/>
@@ -8031,7 +8017,7 @@
             </p:txBody>
           </p:sp>
         </mc:Choice>
-        <mc:Fallback>
+        <mc:Fallback xmlns="">
           <p:sp>
             <p:nvSpPr>
               <p:cNvPr id="3" name="Content Placeholder 2"/>
@@ -8121,8 +8107,8 @@
           </a:p>
         </p:txBody>
       </p:sp>
-      <mc:AlternateContent xmlns:mc="http://schemas.openxmlformats.org/markup-compatibility/2006">
-        <mc:Choice xmlns:a14="http://schemas.microsoft.com/office/drawing/2010/main" Requires="a14">
+      <mc:AlternateContent xmlns:mc="http://schemas.openxmlformats.org/markup-compatibility/2006" xmlns:a14="http://schemas.microsoft.com/office/drawing/2010/main">
+        <mc:Choice Requires="a14">
           <p:sp>
             <p:nvSpPr>
               <p:cNvPr id="3" name="Content Placeholder 2"/>
@@ -8322,7 +8308,7 @@
             </p:txBody>
           </p:sp>
         </mc:Choice>
-        <mc:Fallback>
+        <mc:Fallback xmlns="">
           <p:sp>
             <p:nvSpPr>
               <p:cNvPr id="3" name="Content Placeholder 2"/>
@@ -8690,8 +8676,8 @@
           </a:p>
         </p:txBody>
       </p:sp>
-      <mc:AlternateContent xmlns:mc="http://schemas.openxmlformats.org/markup-compatibility/2006">
-        <mc:Choice xmlns:a14="http://schemas.microsoft.com/office/drawing/2010/main" Requires="a14">
+      <mc:AlternateContent xmlns:mc="http://schemas.openxmlformats.org/markup-compatibility/2006" xmlns:a14="http://schemas.microsoft.com/office/drawing/2010/main">
+        <mc:Choice Requires="a14">
           <p:sp>
             <p:nvSpPr>
               <p:cNvPr id="3" name="Content Placeholder 2"/>
@@ -8778,7 +8764,7 @@
             </p:txBody>
           </p:sp>
         </mc:Choice>
-        <mc:Fallback>
+        <mc:Fallback xmlns="">
           <p:sp>
             <p:nvSpPr>
               <p:cNvPr id="3" name="Content Placeholder 2"/>
@@ -9683,8 +9669,8 @@
           </a:p>
         </p:txBody>
       </p:sp>
-      <mc:AlternateContent xmlns:mc="http://schemas.openxmlformats.org/markup-compatibility/2006">
-        <mc:Choice xmlns:a14="http://schemas.microsoft.com/office/drawing/2010/main" Requires="a14">
+      <mc:AlternateContent xmlns:mc="http://schemas.openxmlformats.org/markup-compatibility/2006" xmlns:a14="http://schemas.microsoft.com/office/drawing/2010/main">
+        <mc:Choice Requires="a14">
           <p:sp>
             <p:nvSpPr>
               <p:cNvPr id="4" name="Text Placeholder 3"/>
@@ -9798,7 +9784,7 @@
             </p:txBody>
           </p:sp>
         </mc:Choice>
-        <mc:Fallback>
+        <mc:Fallback xmlns="">
           <p:sp>
             <p:nvSpPr>
               <p:cNvPr id="4" name="Text Placeholder 3"/>

</xml_diff>